<commit_message>
updated EDA. PPT. added images
</commit_message>
<xml_diff>
--- a/Resources/Capstone 2 Deliverables.pptx
+++ b/Resources/Capstone 2 Deliverables.pptx
@@ -17765,15 +17765,708 @@
           </a:ln>
         </p:spPr>
       </p:pic>
+    </p:spTree>
+  </p:cSld>
+  <p:clrMapOvr>
+    <a:masterClrMapping/>
+  </p:clrMapOvr>
+  <p:transition xmlns:p14="http://schemas.microsoft.com/office/powerpoint/2010/main" spd="med" advClick="1"/>
+</p:sld>
+</file>
+
+<file path=ppt/slides/slide11.xml><?xml version="1.0" encoding="utf-8"?>
+<p:sld xmlns:a="http://schemas.openxmlformats.org/drawingml/2006/main" xmlns:r="http://schemas.openxmlformats.org/officeDocument/2006/relationships" xmlns:p="http://schemas.openxmlformats.org/presentationml/2006/main" xmlns:m="http://schemas.openxmlformats.org/officeDocument/2006/math" xmlns:a14="http://schemas.microsoft.com/office/drawing/2010/main" showMasterSp="1" showMasterPhAnim="1">
+  <p:cSld>
+    <p:spTree>
+      <p:nvGrpSpPr>
+        <p:cNvPr id="1" name=""/>
+        <p:cNvGrpSpPr/>
+        <p:nvPr/>
+      </p:nvGrpSpPr>
+      <p:grpSpPr>
+        <a:xfrm>
+          <a:off x="0" y="0"/>
+          <a:ext cx="0" cy="0"/>
+          <a:chOff x="0" y="0"/>
+          <a:chExt cx="0" cy="0"/>
+        </a:xfrm>
+      </p:grpSpPr>
+      <p:sp>
+        <p:nvSpPr>
+          <p:cNvPr id="387" name="Google Shape;350;p23"/>
+          <p:cNvSpPr txBox="1"/>
+          <p:nvPr/>
+        </p:nvSpPr>
+        <p:spPr>
+          <a:xfrm>
+            <a:off x="430000" y="150999"/>
+            <a:ext cx="3232500" cy="386051"/>
+          </a:xfrm>
+          <a:prstGeom prst="rect">
+            <a:avLst/>
+          </a:prstGeom>
+          <a:ln w="12700">
+            <a:miter lim="400000"/>
+          </a:ln>
+          <a:extLst>
+            <a:ext uri="{C572A759-6A51-4108-AA02-DFA0A04FC94B}">
+              <ma14:wrappingTextBoxFlag xmlns:ma14="http://schemas.microsoft.com/office/mac/drawingml/2011/main" val="1"/>
+            </a:ext>
+          </a:extLst>
+        </p:spPr>
+        <p:txBody>
+          <a:bodyPr lIns="91424" tIns="91424" rIns="91424" bIns="91424">
+            <a:spAutoFit/>
+          </a:bodyPr>
+          <a:lstStyle>
+            <a:lvl1pPr>
+              <a:defRPr b="1" sz="1300">
+                <a:solidFill>
+                  <a:srgbClr val="424242"/>
+                </a:solidFill>
+                <a:latin typeface="Nunito"/>
+                <a:ea typeface="Nunito"/>
+                <a:cs typeface="Nunito"/>
+                <a:sym typeface="Nunito"/>
+              </a:defRPr>
+            </a:lvl1pPr>
+          </a:lstStyle>
+          <a:p>
+            <a:pPr/>
+            <a:r>
+              <a:t>EDA</a:t>
+            </a:r>
+          </a:p>
+        </p:txBody>
+      </p:sp>
+      <p:pic>
+        <p:nvPicPr>
+          <p:cNvPr id="388" name="27JAN2021_QQQ_closing_price_chart.png" descr="27JAN2021_QQQ_closing_price_chart.png"/>
+          <p:cNvPicPr>
+            <a:picLocks noChangeAspect="1"/>
+          </p:cNvPicPr>
+          <p:nvPr/>
+        </p:nvPicPr>
+        <p:blipFill>
+          <a:blip r:embed="rId2">
+            <a:extLst/>
+          </a:blip>
+          <a:stretch>
+            <a:fillRect/>
+          </a:stretch>
+        </p:blipFill>
+        <p:spPr>
+          <a:xfrm>
+            <a:off x="121348" y="506159"/>
+            <a:ext cx="3334227" cy="1256504"/>
+          </a:xfrm>
+          <a:prstGeom prst="rect">
+            <a:avLst/>
+          </a:prstGeom>
+          <a:ln w="12700">
+            <a:miter lim="400000"/>
+          </a:ln>
+        </p:spPr>
+      </p:pic>
+      <p:pic>
+        <p:nvPicPr>
+          <p:cNvPr id="389" name="27JAN2021_QQQ_polyfit.png" descr="27JAN2021_QQQ_polyfit.png"/>
+          <p:cNvPicPr>
+            <a:picLocks noChangeAspect="1"/>
+          </p:cNvPicPr>
+          <p:nvPr/>
+        </p:nvPicPr>
+        <p:blipFill>
+          <a:blip r:embed="rId3">
+            <a:extLst/>
+          </a:blip>
+          <a:stretch>
+            <a:fillRect/>
+          </a:stretch>
+        </p:blipFill>
+        <p:spPr>
+          <a:xfrm>
+            <a:off x="222231" y="2416715"/>
+            <a:ext cx="3232501" cy="2405185"/>
+          </a:xfrm>
+          <a:prstGeom prst="rect">
+            <a:avLst/>
+          </a:prstGeom>
+          <a:ln w="12700">
+            <a:miter lim="400000"/>
+          </a:ln>
+        </p:spPr>
+      </p:pic>
+      <p:sp>
+        <p:nvSpPr>
+          <p:cNvPr id="390" name="QQQ Data w/ Polynomial Fit &amp; localized Min/Max"/>
+          <p:cNvSpPr txBox="1"/>
+          <p:nvPr/>
+        </p:nvSpPr>
+        <p:spPr>
+          <a:xfrm>
+            <a:off x="233915" y="1990997"/>
+            <a:ext cx="3876118" cy="197384"/>
+          </a:xfrm>
+          <a:prstGeom prst="rect">
+            <a:avLst/>
+          </a:prstGeom>
+          <a:ln w="12700">
+            <a:miter lim="400000"/>
+          </a:ln>
+          <a:extLst>
+            <a:ext uri="{C572A759-6A51-4108-AA02-DFA0A04FC94B}">
+              <ma14:wrappingTextBoxFlag xmlns:ma14="http://schemas.microsoft.com/office/mac/drawingml/2011/main" val="1"/>
+            </a:ext>
+          </a:extLst>
+        </p:spPr>
+        <p:txBody>
+          <a:bodyPr wrap="none" lIns="0" tIns="0" rIns="0" bIns="0">
+            <a:spAutoFit/>
+          </a:bodyPr>
+          <a:lstStyle>
+            <a:lvl1pPr>
+              <a:defRPr>
+                <a:solidFill>
+                  <a:srgbClr val="000000"/>
+                </a:solidFill>
+              </a:defRPr>
+            </a:lvl1pPr>
+          </a:lstStyle>
+          <a:p>
+            <a:pPr/>
+            <a:r>
+              <a:t>QQQ Data w/ Polynomial Fit &amp; localized Min/Max</a:t>
+            </a:r>
+          </a:p>
+        </p:txBody>
+      </p:sp>
+      <p:sp>
+        <p:nvSpPr>
+          <p:cNvPr id="391" name="Line"/>
+          <p:cNvSpPr/>
+          <p:nvPr/>
+        </p:nvSpPr>
+        <p:spPr>
+          <a:xfrm flipH="1">
+            <a:off x="1787814" y="2909562"/>
+            <a:ext cx="319198" cy="319198"/>
+          </a:xfrm>
+          <a:prstGeom prst="line">
+            <a:avLst/>
+          </a:prstGeom>
+          <a:ln w="25400">
+            <a:solidFill>
+              <a:schemeClr val="accent1"/>
+            </a:solidFill>
+            <a:tailEnd type="triangle"/>
+          </a:ln>
+          <a:effectLst>
+            <a:outerShdw sx="100000" sy="100000" kx="0" ky="0" algn="b" rotWithShape="0" blurRad="38100" dist="20000" dir="5400000">
+              <a:srgbClr val="000000">
+                <a:alpha val="38000"/>
+              </a:srgbClr>
+            </a:outerShdw>
+          </a:effectLst>
+        </p:spPr>
+        <p:txBody>
+          <a:bodyPr lIns="0" tIns="0" rIns="0" bIns="0"/>
+          <a:lstStyle/>
+          <a:p>
+            <a:pPr/>
+          </a:p>
+        </p:txBody>
+      </p:sp>
+      <p:sp>
+        <p:nvSpPr>
+          <p:cNvPr id="392" name="Line"/>
+          <p:cNvSpPr/>
+          <p:nvPr/>
+        </p:nvSpPr>
+        <p:spPr>
+          <a:xfrm>
+            <a:off x="2131315" y="2926880"/>
+            <a:ext cx="1" cy="386051"/>
+          </a:xfrm>
+          <a:prstGeom prst="line">
+            <a:avLst/>
+          </a:prstGeom>
+          <a:ln w="25400">
+            <a:solidFill>
+              <a:schemeClr val="accent1"/>
+            </a:solidFill>
+            <a:tailEnd type="triangle"/>
+          </a:ln>
+          <a:effectLst>
+            <a:outerShdw sx="100000" sy="100000" kx="0" ky="0" algn="b" rotWithShape="0" blurRad="38100" dist="20000" dir="5400000">
+              <a:srgbClr val="000000">
+                <a:alpha val="38000"/>
+              </a:srgbClr>
+            </a:outerShdw>
+          </a:effectLst>
+        </p:spPr>
+        <p:txBody>
+          <a:bodyPr lIns="0" tIns="0" rIns="0" bIns="0"/>
+          <a:lstStyle/>
+          <a:p>
+            <a:pPr/>
+          </a:p>
+        </p:txBody>
+      </p:sp>
+      <p:sp>
+        <p:nvSpPr>
+          <p:cNvPr id="393" name="Oval"/>
+          <p:cNvSpPr/>
+          <p:nvPr/>
+        </p:nvSpPr>
+        <p:spPr>
+          <a:xfrm>
+            <a:off x="2093215" y="2878988"/>
+            <a:ext cx="76201" cy="68598"/>
+          </a:xfrm>
+          <a:prstGeom prst="ellipse">
+            <a:avLst/>
+          </a:prstGeom>
+          <a:solidFill>
+            <a:schemeClr val="accent1">
+              <a:lumOff val="-4980"/>
+            </a:schemeClr>
+          </a:solidFill>
+          <a:ln w="12700">
+            <a:miter lim="400000"/>
+          </a:ln>
+        </p:spPr>
+        <p:txBody>
+          <a:bodyPr lIns="0" tIns="0" rIns="0" bIns="0"/>
+          <a:lstStyle/>
+          <a:p>
+            <a:pPr/>
+          </a:p>
+        </p:txBody>
+      </p:sp>
+      <p:sp>
+        <p:nvSpPr>
+          <p:cNvPr id="394" name="Double Top"/>
+          <p:cNvSpPr txBox="1"/>
+          <p:nvPr/>
+        </p:nvSpPr>
+        <p:spPr>
+          <a:xfrm>
+            <a:off x="2496716" y="2473058"/>
+            <a:ext cx="908994" cy="197384"/>
+          </a:xfrm>
+          <a:prstGeom prst="rect">
+            <a:avLst/>
+          </a:prstGeom>
+          <a:ln w="12700">
+            <a:miter lim="400000"/>
+          </a:ln>
+          <a:extLst>
+            <a:ext uri="{C572A759-6A51-4108-AA02-DFA0A04FC94B}">
+              <ma14:wrappingTextBoxFlag xmlns:ma14="http://schemas.microsoft.com/office/mac/drawingml/2011/main" val="1"/>
+            </a:ext>
+          </a:extLst>
+        </p:spPr>
+        <p:txBody>
+          <a:bodyPr wrap="none" lIns="0" tIns="0" rIns="0" bIns="0">
+            <a:spAutoFit/>
+          </a:bodyPr>
+          <a:lstStyle>
+            <a:lvl1pPr>
+              <a:defRPr>
+                <a:solidFill>
+                  <a:schemeClr val="accent1">
+                    <a:lumOff val="-4980"/>
+                  </a:schemeClr>
+                </a:solidFill>
+              </a:defRPr>
+            </a:lvl1pPr>
+          </a:lstStyle>
+          <a:p>
+            <a:pPr/>
+            <a:r>
+              <a:t>Double Top</a:t>
+            </a:r>
+          </a:p>
+        </p:txBody>
+      </p:sp>
+      <p:sp>
+        <p:nvSpPr>
+          <p:cNvPr id="395" name="Line"/>
+          <p:cNvSpPr/>
+          <p:nvPr/>
+        </p:nvSpPr>
+        <p:spPr>
+          <a:xfrm flipV="1">
+            <a:off x="2117779" y="2549145"/>
+            <a:ext cx="368090" cy="368091"/>
+          </a:xfrm>
+          <a:prstGeom prst="line">
+            <a:avLst/>
+          </a:prstGeom>
+          <a:ln w="25400">
+            <a:solidFill>
+              <a:schemeClr val="accent1"/>
+            </a:solidFill>
+          </a:ln>
+          <a:effectLst>
+            <a:outerShdw sx="100000" sy="100000" kx="0" ky="0" algn="b" rotWithShape="0" blurRad="38100" dist="20000" dir="5400000">
+              <a:srgbClr val="000000">
+                <a:alpha val="38000"/>
+              </a:srgbClr>
+            </a:outerShdw>
+          </a:effectLst>
+        </p:spPr>
+        <p:txBody>
+          <a:bodyPr lIns="0" tIns="0" rIns="0" bIns="0"/>
+          <a:lstStyle/>
+          <a:p>
+            <a:pPr/>
+          </a:p>
+        </p:txBody>
+      </p:sp>
+      <p:sp>
+        <p:nvSpPr>
+          <p:cNvPr id="396" name="Pattern Identification"/>
+          <p:cNvSpPr txBox="1"/>
+          <p:nvPr/>
+        </p:nvSpPr>
+        <p:spPr>
+          <a:xfrm>
+            <a:off x="4295536" y="381573"/>
+            <a:ext cx="1633650" cy="197384"/>
+          </a:xfrm>
+          <a:prstGeom prst="rect">
+            <a:avLst/>
+          </a:prstGeom>
+          <a:ln w="12700">
+            <a:miter lim="400000"/>
+          </a:ln>
+          <a:extLst>
+            <a:ext uri="{C572A759-6A51-4108-AA02-DFA0A04FC94B}">
+              <ma14:wrappingTextBoxFlag xmlns:ma14="http://schemas.microsoft.com/office/mac/drawingml/2011/main" val="1"/>
+            </a:ext>
+          </a:extLst>
+        </p:spPr>
+        <p:txBody>
+          <a:bodyPr wrap="none" lIns="0" tIns="0" rIns="0" bIns="0">
+            <a:spAutoFit/>
+          </a:bodyPr>
+          <a:lstStyle>
+            <a:lvl1pPr>
+              <a:defRPr>
+                <a:solidFill>
+                  <a:srgbClr val="000000"/>
+                </a:solidFill>
+              </a:defRPr>
+            </a:lvl1pPr>
+          </a:lstStyle>
+          <a:p>
+            <a:pPr/>
+            <a:r>
+              <a:t>Pattern Identification</a:t>
+            </a:r>
+          </a:p>
+        </p:txBody>
+      </p:sp>
+      <p:sp>
+        <p:nvSpPr>
+          <p:cNvPr id="397" name="Double top/bottom patterns are technical reversal patterns that form after an asset reaches a high/low price two consecutive times with a moderate decline/incline between the two high/lows.…"/>
+          <p:cNvSpPr txBox="1"/>
+          <p:nvPr/>
+        </p:nvSpPr>
+        <p:spPr>
+          <a:xfrm>
+            <a:off x="4295536" y="674238"/>
+            <a:ext cx="4552661" cy="1520262"/>
+          </a:xfrm>
+          <a:prstGeom prst="rect">
+            <a:avLst/>
+          </a:prstGeom>
+          <a:ln w="12700">
+            <a:miter lim="400000"/>
+          </a:ln>
+          <a:extLst>
+            <a:ext uri="{C572A759-6A51-4108-AA02-DFA0A04FC94B}">
+              <ma14:wrappingTextBoxFlag xmlns:ma14="http://schemas.microsoft.com/office/mac/drawingml/2011/main" val="1"/>
+            </a:ext>
+          </a:extLst>
+        </p:spPr>
+        <p:txBody>
+          <a:bodyPr lIns="0" tIns="0" rIns="0" bIns="0">
+            <a:spAutoFit/>
+          </a:bodyPr>
+          <a:lstStyle/>
+          <a:p>
+            <a:pPr>
+              <a:defRPr sz="900"/>
+            </a:pPr>
+            <a:r>
+              <a:t>Double top/bottom patterns are technical reversal patterns that form after an asset reaches a high/low price two consecutive times with a moderate decline/incline between the two high/lows.</a:t>
+            </a:r>
+          </a:p>
+          <a:p>
+            <a:pPr>
+              <a:defRPr sz="900"/>
+            </a:pPr>
+          </a:p>
+          <a:p>
+            <a:pPr>
+              <a:defRPr sz="900"/>
+            </a:pPr>
+            <a:r>
+              <a:t>These patterns are not always easy to spot because there needs to be confirmation with break below support.</a:t>
+            </a:r>
+          </a:p>
+          <a:p>
+            <a:pPr>
+              <a:defRPr sz="900"/>
+            </a:pPr>
+          </a:p>
+          <a:p>
+            <a:pPr>
+              <a:defRPr sz="900"/>
+            </a:pPr>
+            <a:r>
+              <a:t>Key Elements of a Double Top/Bottom:</a:t>
+            </a:r>
+          </a:p>
+          <a:p>
+            <a:pPr marL="183815" indent="-183815">
+              <a:buSzPct val="100000"/>
+              <a:buAutoNum type="alphaLcPeriod" startAt="1"/>
+              <a:defRPr sz="900"/>
+            </a:pPr>
+            <a:r>
+              <a:t>Up/down-trend: price should clearly be moving in an up or down direction.</a:t>
+            </a:r>
+          </a:p>
+          <a:p>
+            <a:pPr>
+              <a:defRPr sz="900"/>
+            </a:pPr>
+            <a:r>
+              <a:t>b. Valley for double top pattern, or peak for double bottom pattern.</a:t>
+            </a:r>
+          </a:p>
+          <a:p>
+            <a:pPr>
+              <a:defRPr sz="900"/>
+            </a:pPr>
+            <a:r>
+              <a:t>c. Neckline break: horizontal line that is created at the respective.</a:t>
+            </a:r>
+          </a:p>
+          <a:p>
+            <a:pPr>
+              <a:defRPr sz="900"/>
+            </a:pPr>
+            <a:r>
+              <a:t>d. Break of Neckline: price drop below/above horizontal neckline. Initiate trigger. </a:t>
+            </a:r>
+          </a:p>
+        </p:txBody>
+      </p:sp>
+      <p:sp>
+        <p:nvSpPr>
+          <p:cNvPr id="398" name="Extrapolating Local Minima &amp; Maxima"/>
+          <p:cNvSpPr txBox="1"/>
+          <p:nvPr/>
+        </p:nvSpPr>
+        <p:spPr>
+          <a:xfrm>
+            <a:off x="4295536" y="2289781"/>
+            <a:ext cx="2987118" cy="197384"/>
+          </a:xfrm>
+          <a:prstGeom prst="rect">
+            <a:avLst/>
+          </a:prstGeom>
+          <a:ln w="12700">
+            <a:miter lim="400000"/>
+          </a:ln>
+          <a:extLst>
+            <a:ext uri="{C572A759-6A51-4108-AA02-DFA0A04FC94B}">
+              <ma14:wrappingTextBoxFlag xmlns:ma14="http://schemas.microsoft.com/office/mac/drawingml/2011/main" val="1"/>
+            </a:ext>
+          </a:extLst>
+        </p:spPr>
+        <p:txBody>
+          <a:bodyPr wrap="none" lIns="0" tIns="0" rIns="0" bIns="0">
+            <a:spAutoFit/>
+          </a:bodyPr>
+          <a:lstStyle>
+            <a:lvl1pPr>
+              <a:defRPr>
+                <a:solidFill>
+                  <a:srgbClr val="000000"/>
+                </a:solidFill>
+              </a:defRPr>
+            </a:lvl1pPr>
+          </a:lstStyle>
+          <a:p>
+            <a:pPr/>
+            <a:r>
+              <a:t>Extrapolating Local Minima &amp; Maxima</a:t>
+            </a:r>
+          </a:p>
+        </p:txBody>
+      </p:sp>
+      <p:sp>
+        <p:nvSpPr>
+          <p:cNvPr id="399" name="Defining Pattern Parameters &amp; Assigning Feature Data"/>
+          <p:cNvSpPr txBox="1"/>
+          <p:nvPr/>
+        </p:nvSpPr>
+        <p:spPr>
+          <a:xfrm>
+            <a:off x="4295536" y="2965979"/>
+            <a:ext cx="4321659" cy="197384"/>
+          </a:xfrm>
+          <a:prstGeom prst="rect">
+            <a:avLst/>
+          </a:prstGeom>
+          <a:ln w="12700">
+            <a:miter lim="400000"/>
+          </a:ln>
+          <a:extLst>
+            <a:ext uri="{C572A759-6A51-4108-AA02-DFA0A04FC94B}">
+              <ma14:wrappingTextBoxFlag xmlns:ma14="http://schemas.microsoft.com/office/mac/drawingml/2011/main" val="1"/>
+            </a:ext>
+          </a:extLst>
+        </p:spPr>
+        <p:txBody>
+          <a:bodyPr wrap="none" lIns="0" tIns="0" rIns="0" bIns="0">
+            <a:spAutoFit/>
+          </a:bodyPr>
+          <a:lstStyle>
+            <a:lvl1pPr>
+              <a:defRPr>
+                <a:solidFill>
+                  <a:srgbClr val="000000"/>
+                </a:solidFill>
+              </a:defRPr>
+            </a:lvl1pPr>
+          </a:lstStyle>
+          <a:p>
+            <a:pPr/>
+            <a:r>
+              <a:t>Defining Pattern Parameters &amp; Assigning Feature Data</a:t>
+            </a:r>
+          </a:p>
+        </p:txBody>
+      </p:sp>
+    </p:spTree>
+  </p:cSld>
+  <p:clrMapOvr>
+    <a:masterClrMapping/>
+  </p:clrMapOvr>
+  <p:transition xmlns:p14="http://schemas.microsoft.com/office/powerpoint/2010/main" spd="med" advClick="1"/>
+</p:sld>
+</file>
+
+<file path=ppt/slides/slide12.xml><?xml version="1.0" encoding="utf-8"?>
+<p:sld xmlns:a="http://schemas.openxmlformats.org/drawingml/2006/main" xmlns:r="http://schemas.openxmlformats.org/officeDocument/2006/relationships" xmlns:p="http://schemas.openxmlformats.org/presentationml/2006/main" xmlns:m="http://schemas.openxmlformats.org/officeDocument/2006/math" xmlns:a14="http://schemas.microsoft.com/office/drawing/2010/main" showMasterSp="1" showMasterPhAnim="1">
+  <p:cSld>
+    <p:spTree>
+      <p:nvGrpSpPr>
+        <p:cNvPr id="1" name=""/>
+        <p:cNvGrpSpPr/>
+        <p:nvPr/>
+      </p:nvGrpSpPr>
+      <p:grpSpPr>
+        <a:xfrm>
+          <a:off x="0" y="0"/>
+          <a:ext cx="0" cy="0"/>
+          <a:chOff x="0" y="0"/>
+          <a:chExt cx="0" cy="0"/>
+        </a:xfrm>
+      </p:grpSpPr>
+      <p:sp>
+        <p:nvSpPr>
+          <p:cNvPr id="401" name="Google Shape;357;p24"/>
+          <p:cNvSpPr txBox="1"/>
+          <p:nvPr/>
+        </p:nvSpPr>
+        <p:spPr>
+          <a:xfrm>
+            <a:off x="429999" y="150999"/>
+            <a:ext cx="4258802" cy="386051"/>
+          </a:xfrm>
+          <a:prstGeom prst="rect">
+            <a:avLst/>
+          </a:prstGeom>
+          <a:ln w="12700">
+            <a:miter lim="400000"/>
+          </a:ln>
+          <a:extLst>
+            <a:ext uri="{C572A759-6A51-4108-AA02-DFA0A04FC94B}">
+              <ma14:wrappingTextBoxFlag xmlns:ma14="http://schemas.microsoft.com/office/mac/drawingml/2011/main" val="1"/>
+            </a:ext>
+          </a:extLst>
+        </p:spPr>
+        <p:txBody>
+          <a:bodyPr lIns="91424" tIns="91424" rIns="91424" bIns="91424">
+            <a:spAutoFit/>
+          </a:bodyPr>
+          <a:lstStyle>
+            <a:lvl1pPr>
+              <a:defRPr b="1" sz="1300">
+                <a:solidFill>
+                  <a:srgbClr val="424242"/>
+                </a:solidFill>
+                <a:latin typeface="Nunito"/>
+                <a:ea typeface="Nunito"/>
+                <a:cs typeface="Nunito"/>
+                <a:sym typeface="Nunito"/>
+              </a:defRPr>
+            </a:lvl1pPr>
+          </a:lstStyle>
+          <a:p>
+            <a:pPr/>
+            <a:r>
+              <a:t>Initial and Final Model Selection (+Benchmarks)</a:t>
+            </a:r>
+          </a:p>
+        </p:txBody>
+      </p:sp>
+      <p:pic>
+        <p:nvPicPr>
+          <p:cNvPr id="402" name="Google Shape;358;p24" descr="Google Shape;358;p24"/>
+          <p:cNvPicPr>
+            <a:picLocks noChangeAspect="1"/>
+          </p:cNvPicPr>
+          <p:nvPr/>
+        </p:nvPicPr>
+        <p:blipFill>
+          <a:blip r:embed="rId2">
+            <a:extLst/>
+          </a:blip>
+          <a:stretch>
+            <a:fillRect/>
+          </a:stretch>
+        </p:blipFill>
+        <p:spPr>
+          <a:xfrm>
+            <a:off x="1203951" y="469249"/>
+            <a:ext cx="6197178" cy="4579601"/>
+          </a:xfrm>
+          <a:prstGeom prst="rect">
+            <a:avLst/>
+          </a:prstGeom>
+          <a:ln w="12700">
+            <a:miter lim="400000"/>
+          </a:ln>
+        </p:spPr>
+      </p:pic>
       <p:grpSp>
         <p:nvGrpSpPr>
-          <p:cNvPr id="388" name="Google Shape;345;p22"/>
+          <p:cNvPr id="405" name="Google Shape;359;p24"/>
           <p:cNvGrpSpPr/>
           <p:nvPr/>
         </p:nvGrpSpPr>
         <p:grpSpPr>
           <a:xfrm>
-            <a:off x="2348774" y="1515404"/>
+            <a:off x="1357824" y="1432829"/>
             <a:ext cx="5692202" cy="2487302"/>
             <a:chOff x="0" y="0"/>
             <a:chExt cx="5692200" cy="2487300"/>
@@ -17781,7 +18474,7 @@
         </p:grpSpPr>
         <p:sp>
           <p:nvSpPr>
-            <p:cNvPr id="386" name="Rectangle"/>
+            <p:cNvPr id="403" name="Rectangle"/>
             <p:cNvSpPr/>
             <p:nvPr/>
           </p:nvSpPr>
@@ -17834,584 +18527,7 @@
         </p:sp>
         <p:sp>
           <p:nvSpPr>
-            <p:cNvPr id="387" name="Reminder - this is a TEMPLATE. Please use this as a source of inspiration and transform this into a deck of your own.…"/>
-            <p:cNvSpPr txBox="1"/>
-            <p:nvPr/>
-          </p:nvSpPr>
-          <p:spPr>
-            <a:xfrm>
-              <a:off x="-1" y="-1"/>
-              <a:ext cx="5692202" cy="2418051"/>
-            </a:xfrm>
-            <a:prstGeom prst="rect">
-              <a:avLst/>
-            </a:prstGeom>
-            <a:noFill/>
-            <a:ln w="12700" cap="flat">
-              <a:noFill/>
-              <a:miter lim="400000"/>
-            </a:ln>
-            <a:effectLst/>
-            <a:extLst>
-              <a:ext uri="{C572A759-6A51-4108-AA02-DFA0A04FC94B}">
-                <ma14:wrappingTextBoxFlag xmlns:ma14="http://schemas.microsoft.com/office/mac/drawingml/2011/main" val="1"/>
-              </a:ext>
-            </a:extLst>
-          </p:spPr>
-          <p:txBody>
-            <a:bodyPr wrap="square" lIns="91424" tIns="91424" rIns="91424" bIns="91424" numCol="1" anchor="t">
-              <a:spAutoFit/>
-            </a:bodyPr>
-            <a:lstStyle/>
-            <a:p>
-              <a:pPr>
-                <a:defRPr sz="1300">
-                  <a:solidFill>
-                    <a:srgbClr val="424242"/>
-                  </a:solidFill>
-                  <a:latin typeface="Nunito"/>
-                  <a:ea typeface="Nunito"/>
-                  <a:cs typeface="Nunito"/>
-                  <a:sym typeface="Nunito"/>
-                </a:defRPr>
-              </a:pPr>
-              <a:r>
-                <a:t>Reminder - this is a TEMPLATE. Please use this as a source of inspiration and transform this into a deck of your own.</a:t>
-              </a:r>
-            </a:p>
-            <a:p>
-              <a:pPr>
-                <a:defRPr>
-                  <a:solidFill>
-                    <a:srgbClr val="000000"/>
-                  </a:solidFill>
-                </a:defRPr>
-              </a:pPr>
-              <a:endParaRPr sz="1300">
-                <a:solidFill>
-                  <a:srgbClr val="424242"/>
-                </a:solidFill>
-                <a:latin typeface="Nunito"/>
-                <a:ea typeface="Nunito"/>
-                <a:cs typeface="Nunito"/>
-                <a:sym typeface="Nunito"/>
-              </a:endParaRPr>
-            </a:p>
-            <a:p>
-              <a:pPr>
-                <a:defRPr sz="1300">
-                  <a:solidFill>
-                    <a:srgbClr val="424242"/>
-                  </a:solidFill>
-                  <a:latin typeface="Nunito"/>
-                  <a:ea typeface="Nunito"/>
-                  <a:cs typeface="Nunito"/>
-                  <a:sym typeface="Nunito"/>
-                </a:defRPr>
-              </a:pPr>
-              <a:r>
-                <a:t>Reminder - Include important data sources and features that are important and you curated (start of feature engineering). This is a really great diagram showing what you might do to each dataset before you combine and you might add steps for after. The only thing missing is that, in the blue boxes, there should be words for the columns, like “ema_20” or “customer id” to denote the actual data. </a:t>
-              </a:r>
-            </a:p>
-            <a:p>
-              <a:pPr>
-                <a:defRPr>
-                  <a:solidFill>
-                    <a:srgbClr val="000000"/>
-                  </a:solidFill>
-                </a:defRPr>
-              </a:pPr>
-              <a:endParaRPr sz="1300">
-                <a:solidFill>
-                  <a:srgbClr val="424242"/>
-                </a:solidFill>
-                <a:latin typeface="Nunito"/>
-                <a:ea typeface="Nunito"/>
-                <a:cs typeface="Nunito"/>
-                <a:sym typeface="Nunito"/>
-              </a:endParaRPr>
-            </a:p>
-            <a:p>
-              <a:pPr>
-                <a:defRPr sz="1300">
-                  <a:solidFill>
-                    <a:srgbClr val="424242"/>
-                  </a:solidFill>
-                  <a:latin typeface="Nunito"/>
-                  <a:ea typeface="Nunito"/>
-                  <a:cs typeface="Nunito"/>
-                  <a:sym typeface="Nunito"/>
-                </a:defRPr>
-              </a:pPr>
-              <a:r>
-                <a:t>Please remove this before using this slide.</a:t>
-              </a:r>
-            </a:p>
-          </p:txBody>
-        </p:sp>
-      </p:grpSp>
-    </p:spTree>
-  </p:cSld>
-  <p:clrMapOvr>
-    <a:masterClrMapping/>
-  </p:clrMapOvr>
-  <p:transition xmlns:p14="http://schemas.microsoft.com/office/powerpoint/2010/main" spd="med" advClick="1"/>
-</p:sld>
-</file>
-
-<file path=ppt/slides/slide11.xml><?xml version="1.0" encoding="utf-8"?>
-<p:sld xmlns:a="http://schemas.openxmlformats.org/drawingml/2006/main" xmlns:r="http://schemas.openxmlformats.org/officeDocument/2006/relationships" xmlns:p="http://schemas.openxmlformats.org/presentationml/2006/main" xmlns:m="http://schemas.openxmlformats.org/officeDocument/2006/math" xmlns:a14="http://schemas.microsoft.com/office/drawing/2010/main" showMasterSp="1" showMasterPhAnim="1">
-  <p:cSld>
-    <p:spTree>
-      <p:nvGrpSpPr>
-        <p:cNvPr id="1" name=""/>
-        <p:cNvGrpSpPr/>
-        <p:nvPr/>
-      </p:nvGrpSpPr>
-      <p:grpSpPr>
-        <a:xfrm>
-          <a:off x="0" y="0"/>
-          <a:ext cx="0" cy="0"/>
-          <a:chOff x="0" y="0"/>
-          <a:chExt cx="0" cy="0"/>
-        </a:xfrm>
-      </p:grpSpPr>
-      <p:sp>
-        <p:nvSpPr>
-          <p:cNvPr id="390" name="Google Shape;350;p23"/>
-          <p:cNvSpPr txBox="1"/>
-          <p:nvPr/>
-        </p:nvSpPr>
-        <p:spPr>
-          <a:xfrm>
-            <a:off x="430000" y="150999"/>
-            <a:ext cx="3232500" cy="386051"/>
-          </a:xfrm>
-          <a:prstGeom prst="rect">
-            <a:avLst/>
-          </a:prstGeom>
-          <a:ln w="12700">
-            <a:miter lim="400000"/>
-          </a:ln>
-          <a:extLst>
-            <a:ext uri="{C572A759-6A51-4108-AA02-DFA0A04FC94B}">
-              <ma14:wrappingTextBoxFlag xmlns:ma14="http://schemas.microsoft.com/office/mac/drawingml/2011/main" val="1"/>
-            </a:ext>
-          </a:extLst>
-        </p:spPr>
-        <p:txBody>
-          <a:bodyPr lIns="91424" tIns="91424" rIns="91424" bIns="91424">
-            <a:spAutoFit/>
-          </a:bodyPr>
-          <a:lstStyle>
-            <a:lvl1pPr>
-              <a:defRPr b="1" sz="1300">
-                <a:solidFill>
-                  <a:srgbClr val="424242"/>
-                </a:solidFill>
-                <a:latin typeface="Nunito"/>
-                <a:ea typeface="Nunito"/>
-                <a:cs typeface="Nunito"/>
-                <a:sym typeface="Nunito"/>
-              </a:defRPr>
-            </a:lvl1pPr>
-          </a:lstStyle>
-          <a:p>
-            <a:pPr/>
-            <a:r>
-              <a:t>EDA</a:t>
-            </a:r>
-          </a:p>
-        </p:txBody>
-      </p:sp>
-      <p:pic>
-        <p:nvPicPr>
-          <p:cNvPr id="391" name="Google Shape;351;p23" descr="Google Shape;351;p23"/>
-          <p:cNvPicPr>
-            <a:picLocks noChangeAspect="1"/>
-          </p:cNvPicPr>
-          <p:nvPr/>
-        </p:nvPicPr>
-        <p:blipFill>
-          <a:blip r:embed="rId2">
-            <a:extLst/>
-          </a:blip>
-          <a:srcRect l="5508" t="0" r="0" b="0"/>
-          <a:stretch>
-            <a:fillRect/>
-          </a:stretch>
-        </p:blipFill>
-        <p:spPr>
-          <a:xfrm>
-            <a:off x="671874" y="569775"/>
-            <a:ext cx="7744526" cy="3913926"/>
-          </a:xfrm>
-          <a:prstGeom prst="rect">
-            <a:avLst/>
-          </a:prstGeom>
-          <a:ln w="12700">
-            <a:miter lim="400000"/>
-          </a:ln>
-        </p:spPr>
-      </p:pic>
-      <p:grpSp>
-        <p:nvGrpSpPr>
-          <p:cNvPr id="394" name="Google Shape;352;p23"/>
-          <p:cNvGrpSpPr/>
-          <p:nvPr/>
-        </p:nvGrpSpPr>
-        <p:grpSpPr>
-          <a:xfrm>
-            <a:off x="1888699" y="1480004"/>
-            <a:ext cx="5692202" cy="2487302"/>
-            <a:chOff x="0" y="0"/>
-            <a:chExt cx="5692200" cy="2487300"/>
-          </a:xfrm>
-        </p:grpSpPr>
-        <p:sp>
-          <p:nvSpPr>
-            <p:cNvPr id="392" name="Rectangle"/>
-            <p:cNvSpPr/>
-            <p:nvPr/>
-          </p:nvSpPr>
-          <p:spPr>
-            <a:xfrm>
-              <a:off x="-1" y="-1"/>
-              <a:ext cx="5692202" cy="2487302"/>
-            </a:xfrm>
-            <a:prstGeom prst="rect">
-              <a:avLst/>
-            </a:prstGeom>
-            <a:gradFill flip="none" rotWithShape="1">
-              <a:gsLst>
-                <a:gs pos="0">
-                  <a:srgbClr val="FE9B9A"/>
-                </a:gs>
-                <a:gs pos="100000">
-                  <a:srgbClr val="F6231F"/>
-                </a:gs>
-              </a:gsLst>
-              <a:path path="circle">
-                <a:fillToRect l="37721" t="-19636" r="62278" b="119636"/>
-              </a:path>
-            </a:gradFill>
-            <a:ln w="12700" cap="flat">
-              <a:noFill/>
-              <a:miter lim="400000"/>
-            </a:ln>
-            <a:effectLst/>
-          </p:spPr>
-          <p:txBody>
-            <a:bodyPr wrap="square" lIns="0" tIns="0" rIns="0" bIns="0" numCol="1" anchor="t">
-              <a:noAutofit/>
-            </a:bodyPr>
-            <a:lstStyle/>
-            <a:p>
-              <a:pPr>
-                <a:defRPr sz="1300">
-                  <a:solidFill>
-                    <a:srgbClr val="424242"/>
-                  </a:solidFill>
-                  <a:latin typeface="Nunito"/>
-                  <a:ea typeface="Nunito"/>
-                  <a:cs typeface="Nunito"/>
-                  <a:sym typeface="Nunito"/>
-                </a:defRPr>
-              </a:pPr>
-            </a:p>
-          </p:txBody>
-        </p:sp>
-        <p:sp>
-          <p:nvSpPr>
-            <p:cNvPr id="393" name="Reminder - this is a TEMPLATE. Please use this as a source of inspiration and transform this into a deck of your own.…"/>
-            <p:cNvSpPr txBox="1"/>
-            <p:nvPr/>
-          </p:nvSpPr>
-          <p:spPr>
-            <a:xfrm>
-              <a:off x="-1" y="-1"/>
-              <a:ext cx="5692202" cy="1808451"/>
-            </a:xfrm>
-            <a:prstGeom prst="rect">
-              <a:avLst/>
-            </a:prstGeom>
-            <a:noFill/>
-            <a:ln w="12700" cap="flat">
-              <a:noFill/>
-              <a:miter lim="400000"/>
-            </a:ln>
-            <a:effectLst/>
-            <a:extLst>
-              <a:ext uri="{C572A759-6A51-4108-AA02-DFA0A04FC94B}">
-                <ma14:wrappingTextBoxFlag xmlns:ma14="http://schemas.microsoft.com/office/mac/drawingml/2011/main" val="1"/>
-              </a:ext>
-            </a:extLst>
-          </p:spPr>
-          <p:txBody>
-            <a:bodyPr wrap="square" lIns="91424" tIns="91424" rIns="91424" bIns="91424" numCol="1" anchor="t">
-              <a:spAutoFit/>
-            </a:bodyPr>
-            <a:lstStyle/>
-            <a:p>
-              <a:pPr>
-                <a:defRPr sz="1300">
-                  <a:solidFill>
-                    <a:srgbClr val="424242"/>
-                  </a:solidFill>
-                  <a:latin typeface="Nunito"/>
-                  <a:ea typeface="Nunito"/>
-                  <a:cs typeface="Nunito"/>
-                  <a:sym typeface="Nunito"/>
-                </a:defRPr>
-              </a:pPr>
-              <a:r>
-                <a:t>Reminder - this is a TEMPLATE. Please use this as a source of inspiration and transform this into a deck of your own.</a:t>
-              </a:r>
-            </a:p>
-            <a:p>
-              <a:pPr>
-                <a:defRPr>
-                  <a:solidFill>
-                    <a:srgbClr val="000000"/>
-                  </a:solidFill>
-                </a:defRPr>
-              </a:pPr>
-              <a:endParaRPr sz="1300">
-                <a:solidFill>
-                  <a:srgbClr val="424242"/>
-                </a:solidFill>
-                <a:latin typeface="Nunito"/>
-                <a:ea typeface="Nunito"/>
-                <a:cs typeface="Nunito"/>
-                <a:sym typeface="Nunito"/>
-              </a:endParaRPr>
-            </a:p>
-            <a:p>
-              <a:pPr>
-                <a:defRPr sz="1300">
-                  <a:solidFill>
-                    <a:srgbClr val="424242"/>
-                  </a:solidFill>
-                  <a:latin typeface="Nunito"/>
-                  <a:ea typeface="Nunito"/>
-                  <a:cs typeface="Nunito"/>
-                  <a:sym typeface="Nunito"/>
-                </a:defRPr>
-              </a:pPr>
-              <a:r>
-                <a:t>Reminder - We should see concise evidence of analysis and stats that you know your data inside and out. Here is where you can highlight the best features that you may eventually use.</a:t>
-              </a:r>
-            </a:p>
-            <a:p>
-              <a:pPr>
-                <a:defRPr>
-                  <a:solidFill>
-                    <a:srgbClr val="000000"/>
-                  </a:solidFill>
-                </a:defRPr>
-              </a:pPr>
-              <a:endParaRPr sz="1300">
-                <a:solidFill>
-                  <a:srgbClr val="424242"/>
-                </a:solidFill>
-                <a:latin typeface="Nunito"/>
-                <a:ea typeface="Nunito"/>
-                <a:cs typeface="Nunito"/>
-                <a:sym typeface="Nunito"/>
-              </a:endParaRPr>
-            </a:p>
-            <a:p>
-              <a:pPr>
-                <a:defRPr sz="1300">
-                  <a:solidFill>
-                    <a:srgbClr val="424242"/>
-                  </a:solidFill>
-                  <a:latin typeface="Nunito"/>
-                  <a:ea typeface="Nunito"/>
-                  <a:cs typeface="Nunito"/>
-                  <a:sym typeface="Nunito"/>
-                </a:defRPr>
-              </a:pPr>
-              <a:r>
-                <a:t>Please remove this before using this slide.</a:t>
-              </a:r>
-            </a:p>
-          </p:txBody>
-        </p:sp>
-      </p:grpSp>
-    </p:spTree>
-  </p:cSld>
-  <p:clrMapOvr>
-    <a:masterClrMapping/>
-  </p:clrMapOvr>
-  <p:transition xmlns:p14="http://schemas.microsoft.com/office/powerpoint/2010/main" spd="med" advClick="1"/>
-</p:sld>
-</file>
-
-<file path=ppt/slides/slide12.xml><?xml version="1.0" encoding="utf-8"?>
-<p:sld xmlns:a="http://schemas.openxmlformats.org/drawingml/2006/main" xmlns:r="http://schemas.openxmlformats.org/officeDocument/2006/relationships" xmlns:p="http://schemas.openxmlformats.org/presentationml/2006/main" xmlns:m="http://schemas.openxmlformats.org/officeDocument/2006/math" xmlns:a14="http://schemas.microsoft.com/office/drawing/2010/main" showMasterSp="1" showMasterPhAnim="1">
-  <p:cSld>
-    <p:spTree>
-      <p:nvGrpSpPr>
-        <p:cNvPr id="1" name=""/>
-        <p:cNvGrpSpPr/>
-        <p:nvPr/>
-      </p:nvGrpSpPr>
-      <p:grpSpPr>
-        <a:xfrm>
-          <a:off x="0" y="0"/>
-          <a:ext cx="0" cy="0"/>
-          <a:chOff x="0" y="0"/>
-          <a:chExt cx="0" cy="0"/>
-        </a:xfrm>
-      </p:grpSpPr>
-      <p:sp>
-        <p:nvSpPr>
-          <p:cNvPr id="396" name="Google Shape;357;p24"/>
-          <p:cNvSpPr txBox="1"/>
-          <p:nvPr/>
-        </p:nvSpPr>
-        <p:spPr>
-          <a:xfrm>
-            <a:off x="429999" y="150999"/>
-            <a:ext cx="4258802" cy="386051"/>
-          </a:xfrm>
-          <a:prstGeom prst="rect">
-            <a:avLst/>
-          </a:prstGeom>
-          <a:ln w="12700">
-            <a:miter lim="400000"/>
-          </a:ln>
-          <a:extLst>
-            <a:ext uri="{C572A759-6A51-4108-AA02-DFA0A04FC94B}">
-              <ma14:wrappingTextBoxFlag xmlns:ma14="http://schemas.microsoft.com/office/mac/drawingml/2011/main" val="1"/>
-            </a:ext>
-          </a:extLst>
-        </p:spPr>
-        <p:txBody>
-          <a:bodyPr lIns="91424" tIns="91424" rIns="91424" bIns="91424">
-            <a:spAutoFit/>
-          </a:bodyPr>
-          <a:lstStyle>
-            <a:lvl1pPr>
-              <a:defRPr b="1" sz="1300">
-                <a:solidFill>
-                  <a:srgbClr val="424242"/>
-                </a:solidFill>
-                <a:latin typeface="Nunito"/>
-                <a:ea typeface="Nunito"/>
-                <a:cs typeface="Nunito"/>
-                <a:sym typeface="Nunito"/>
-              </a:defRPr>
-            </a:lvl1pPr>
-          </a:lstStyle>
-          <a:p>
-            <a:pPr/>
-            <a:r>
-              <a:t>Initial and Final Model Selection (+Benchmarks)</a:t>
-            </a:r>
-          </a:p>
-        </p:txBody>
-      </p:sp>
-      <p:pic>
-        <p:nvPicPr>
-          <p:cNvPr id="397" name="Google Shape;358;p24" descr="Google Shape;358;p24"/>
-          <p:cNvPicPr>
-            <a:picLocks noChangeAspect="1"/>
-          </p:cNvPicPr>
-          <p:nvPr/>
-        </p:nvPicPr>
-        <p:blipFill>
-          <a:blip r:embed="rId2">
-            <a:extLst/>
-          </a:blip>
-          <a:stretch>
-            <a:fillRect/>
-          </a:stretch>
-        </p:blipFill>
-        <p:spPr>
-          <a:xfrm>
-            <a:off x="1203951" y="469249"/>
-            <a:ext cx="6197178" cy="4579601"/>
-          </a:xfrm>
-          <a:prstGeom prst="rect">
-            <a:avLst/>
-          </a:prstGeom>
-          <a:ln w="12700">
-            <a:miter lim="400000"/>
-          </a:ln>
-        </p:spPr>
-      </p:pic>
-      <p:grpSp>
-        <p:nvGrpSpPr>
-          <p:cNvPr id="400" name="Google Shape;359;p24"/>
-          <p:cNvGrpSpPr/>
-          <p:nvPr/>
-        </p:nvGrpSpPr>
-        <p:grpSpPr>
-          <a:xfrm>
-            <a:off x="1357824" y="1432829"/>
-            <a:ext cx="5692202" cy="2487302"/>
-            <a:chOff x="0" y="0"/>
-            <a:chExt cx="5692200" cy="2487300"/>
-          </a:xfrm>
-        </p:grpSpPr>
-        <p:sp>
-          <p:nvSpPr>
-            <p:cNvPr id="398" name="Rectangle"/>
-            <p:cNvSpPr/>
-            <p:nvPr/>
-          </p:nvSpPr>
-          <p:spPr>
-            <a:xfrm>
-              <a:off x="-1" y="-1"/>
-              <a:ext cx="5692202" cy="2487302"/>
-            </a:xfrm>
-            <a:prstGeom prst="rect">
-              <a:avLst/>
-            </a:prstGeom>
-            <a:gradFill flip="none" rotWithShape="1">
-              <a:gsLst>
-                <a:gs pos="0">
-                  <a:srgbClr val="FE9B9A"/>
-                </a:gs>
-                <a:gs pos="100000">
-                  <a:srgbClr val="F6231F"/>
-                </a:gs>
-              </a:gsLst>
-              <a:path path="circle">
-                <a:fillToRect l="37721" t="-19636" r="62278" b="119636"/>
-              </a:path>
-            </a:gradFill>
-            <a:ln w="12700" cap="flat">
-              <a:noFill/>
-              <a:miter lim="400000"/>
-            </a:ln>
-            <a:effectLst/>
-          </p:spPr>
-          <p:txBody>
-            <a:bodyPr wrap="square" lIns="0" tIns="0" rIns="0" bIns="0" numCol="1" anchor="t">
-              <a:noAutofit/>
-            </a:bodyPr>
-            <a:lstStyle/>
-            <a:p>
-              <a:pPr>
-                <a:defRPr sz="1300">
-                  <a:solidFill>
-                    <a:srgbClr val="424242"/>
-                  </a:solidFill>
-                  <a:latin typeface="Nunito"/>
-                  <a:ea typeface="Nunito"/>
-                  <a:cs typeface="Nunito"/>
-                  <a:sym typeface="Nunito"/>
-                </a:defRPr>
-              </a:pPr>
-            </a:p>
-          </p:txBody>
-        </p:sp>
-        <p:sp>
-          <p:nvSpPr>
-            <p:cNvPr id="399" name="Reminder - this is a TEMPLATE. Please use this as a source of inspiration and transform this into a deck of your own.…"/>
+            <p:cNvPr id="404" name="Reminder - this is a TEMPLATE. Please use this as a source of inspiration and transform this into a deck of your own.…"/>
             <p:cNvSpPr txBox="1"/>
             <p:nvPr/>
           </p:nvSpPr>
@@ -18555,7 +18671,7 @@
       </p:grpSpPr>
       <p:sp>
         <p:nvSpPr>
-          <p:cNvPr id="402" name="Google Shape;364;p25"/>
+          <p:cNvPr id="407" name="Google Shape;364;p25"/>
           <p:cNvSpPr txBox="1"/>
           <p:nvPr>
             <p:ph type="title"/>
@@ -18583,7 +18699,7 @@
       </p:sp>
       <p:sp>
         <p:nvSpPr>
-          <p:cNvPr id="403" name="Google Shape;365;p25"/>
+          <p:cNvPr id="408" name="Google Shape;365;p25"/>
           <p:cNvSpPr txBox="1"/>
           <p:nvPr>
             <p:ph type="body" sz="quarter" idx="1"/>
@@ -18620,7 +18736,7 @@
       </p:sp>
       <p:sp>
         <p:nvSpPr>
-          <p:cNvPr id="404" name="Google Shape;366;p25"/>
+          <p:cNvPr id="409" name="Google Shape;366;p25"/>
           <p:cNvSpPr txBox="1"/>
           <p:nvPr/>
         </p:nvSpPr>
@@ -18678,7 +18794,7 @@
       </p:sp>
       <p:sp>
         <p:nvSpPr>
-          <p:cNvPr id="405" name="Google Shape;367;p25"/>
+          <p:cNvPr id="410" name="Google Shape;367;p25"/>
           <p:cNvSpPr txBox="1"/>
           <p:nvPr>
             <p:ph type="body" idx="21"/>
@@ -18719,7 +18835,7 @@
       </p:sp>
       <p:grpSp>
         <p:nvGrpSpPr>
-          <p:cNvPr id="408" name="Google Shape;368;p25"/>
+          <p:cNvPr id="413" name="Google Shape;368;p25"/>
           <p:cNvGrpSpPr/>
           <p:nvPr/>
         </p:nvGrpSpPr>
@@ -18733,7 +18849,7 @@
         </p:grpSpPr>
         <p:sp>
           <p:nvSpPr>
-            <p:cNvPr id="406" name="Rectangle"/>
+            <p:cNvPr id="411" name="Rectangle"/>
             <p:cNvSpPr/>
             <p:nvPr/>
           </p:nvSpPr>
@@ -18786,7 +18902,7 @@
         </p:sp>
         <p:sp>
           <p:nvSpPr>
-            <p:cNvPr id="407" name="Reminder - this is a TEMPLATE. Please use this as a source of inspiration and transform this into a deck of your own.…"/>
+            <p:cNvPr id="412" name="Reminder - this is a TEMPLATE. Please use this as a source of inspiration and transform this into a deck of your own.…"/>
             <p:cNvSpPr txBox="1"/>
             <p:nvPr/>
           </p:nvSpPr>
@@ -18930,7 +19046,7 @@
       </p:grpSpPr>
       <p:sp>
         <p:nvSpPr>
-          <p:cNvPr id="410" name="Google Shape;373;p26"/>
+          <p:cNvPr id="415" name="Google Shape;373;p26"/>
           <p:cNvSpPr txBox="1"/>
           <p:nvPr>
             <p:ph type="title"/>
@@ -18958,7 +19074,7 @@
       </p:sp>
       <p:sp>
         <p:nvSpPr>
-          <p:cNvPr id="411" name="Google Shape;374;p26"/>
+          <p:cNvPr id="416" name="Google Shape;374;p26"/>
           <p:cNvSpPr txBox="1"/>
           <p:nvPr>
             <p:ph type="body" sz="quarter" idx="1"/>
@@ -19006,7 +19122,7 @@
       </p:sp>
       <p:sp>
         <p:nvSpPr>
-          <p:cNvPr id="412" name="Google Shape;375;p26"/>
+          <p:cNvPr id="417" name="Google Shape;375;p26"/>
           <p:cNvSpPr txBox="1"/>
           <p:nvPr>
             <p:ph type="body" idx="21"/>
@@ -19077,7 +19193,7 @@
       </p:sp>
       <p:pic>
         <p:nvPicPr>
-          <p:cNvPr id="413" name="Google Shape;376;p26" descr="Google Shape;376;p26"/>
+          <p:cNvPr id="418" name="Google Shape;376;p26" descr="Google Shape;376;p26"/>
           <p:cNvPicPr>
             <a:picLocks noChangeAspect="1"/>
           </p:cNvPicPr>

</xml_diff>

<commit_message>
updated powerpoint. EDA and datamap. add datamap 1.0 to images. double top logic outline
</commit_message>
<xml_diff>
--- a/Resources/Capstone 2 Deliverables.pptx
+++ b/Resources/Capstone 2 Deliverables.pptx
@@ -17738,7 +17738,7 @@
       </p:sp>
       <p:pic>
         <p:nvPicPr>
-          <p:cNvPr id="385" name="Google Shape;344;p22" descr="Google Shape;344;p22"/>
+          <p:cNvPr id="385" name="pasted-movie.png" descr="pasted-movie.png"/>
           <p:cNvPicPr>
             <a:picLocks noChangeAspect="1"/>
           </p:cNvPicPr>
@@ -17754,8 +17754,8 @@
         </p:blipFill>
         <p:spPr>
           <a:xfrm>
-            <a:off x="465000" y="557125"/>
-            <a:ext cx="7243776" cy="4074601"/>
+            <a:off x="2304387" y="1349"/>
+            <a:ext cx="4535226" cy="5143501"/>
           </a:xfrm>
           <a:prstGeom prst="rect">
             <a:avLst/>
@@ -18052,8 +18052,8 @@
         </p:nvSpPr>
         <p:spPr>
           <a:xfrm>
-            <a:off x="2496716" y="2473058"/>
-            <a:ext cx="908994" cy="197384"/>
+            <a:off x="2117779" y="2661688"/>
+            <a:ext cx="908993" cy="197384"/>
           </a:xfrm>
           <a:prstGeom prst="rect">
             <a:avLst/>
@@ -18097,9 +18097,9 @@
           <p:nvPr/>
         </p:nvSpPr>
         <p:spPr>
-          <a:xfrm flipV="1">
-            <a:off x="2117779" y="2549145"/>
-            <a:ext cx="368090" cy="368091"/>
+          <a:xfrm>
+            <a:off x="2117779" y="2917235"/>
+            <a:ext cx="908994" cy="1"/>
           </a:xfrm>
           <a:prstGeom prst="line">
             <a:avLst/>
@@ -18177,8 +18177,8 @@
         </p:nvSpPr>
         <p:spPr>
           <a:xfrm>
-            <a:off x="4295536" y="674238"/>
-            <a:ext cx="4552661" cy="1520262"/>
+            <a:off x="4295536" y="657260"/>
+            <a:ext cx="4552661" cy="1520261"/>
           </a:xfrm>
           <a:prstGeom prst="rect">
             <a:avLst/>
@@ -18319,7 +18319,7 @@
         </p:nvSpPr>
         <p:spPr>
           <a:xfrm>
-            <a:off x="4295536" y="2965979"/>
+            <a:off x="4295536" y="3033596"/>
             <a:ext cx="4321659" cy="197384"/>
           </a:xfrm>
           <a:prstGeom prst="rect">
@@ -18355,6 +18355,487 @@
           </a:p>
         </p:txBody>
       </p:sp>
+      <p:sp>
+        <p:nvSpPr>
+          <p:cNvPr id="400" name="Daily 5 minute OCHL stock data is to be smoothed via a polynomial fit line in order to easily identify local minima/maxima and Numpy features utilized to establish. Closed polynomial fit data will be used to identify the local minima/maxima as standard d"/>
+          <p:cNvSpPr txBox="1"/>
+          <p:nvPr/>
+        </p:nvSpPr>
+        <p:spPr>
+          <a:xfrm>
+            <a:off x="4295536" y="2508249"/>
+            <a:ext cx="4552661" cy="504262"/>
+          </a:xfrm>
+          <a:prstGeom prst="rect">
+            <a:avLst/>
+          </a:prstGeom>
+          <a:ln w="12700">
+            <a:miter lim="400000"/>
+          </a:ln>
+          <a:extLst>
+            <a:ext uri="{C572A759-6A51-4108-AA02-DFA0A04FC94B}">
+              <ma14:wrappingTextBoxFlag xmlns:ma14="http://schemas.microsoft.com/office/mac/drawingml/2011/main" val="1"/>
+            </a:ext>
+          </a:extLst>
+        </p:spPr>
+        <p:txBody>
+          <a:bodyPr lIns="0" tIns="0" rIns="0" bIns="0">
+            <a:spAutoFit/>
+          </a:bodyPr>
+          <a:lstStyle>
+            <a:lvl1pPr>
+              <a:defRPr sz="900"/>
+            </a:lvl1pPr>
+          </a:lstStyle>
+          <a:p>
+            <a:pPr/>
+            <a:r>
+              <a:t>Daily 5 minute OCHL stock data is to be smoothed via a polynomial fit line in order to easily identify local minima/maxima and Numpy features utilized to establish. Closed polynomial fit data will be used to identify the local minima/maxima as standard day trading practice uses candle close data</a:t>
+            </a:r>
+          </a:p>
+        </p:txBody>
+      </p:sp>
+      <p:sp>
+        <p:nvSpPr>
+          <p:cNvPr id="401" name="Double Top Variables:…"/>
+          <p:cNvSpPr txBox="1"/>
+          <p:nvPr/>
+        </p:nvSpPr>
+        <p:spPr>
+          <a:xfrm>
+            <a:off x="4295536" y="3252065"/>
+            <a:ext cx="2016022" cy="796777"/>
+          </a:xfrm>
+          <a:prstGeom prst="rect">
+            <a:avLst/>
+          </a:prstGeom>
+          <a:ln w="12700">
+            <a:miter lim="400000"/>
+          </a:ln>
+          <a:extLst>
+            <a:ext uri="{C572A759-6A51-4108-AA02-DFA0A04FC94B}">
+              <ma14:wrappingTextBoxFlag xmlns:ma14="http://schemas.microsoft.com/office/mac/drawingml/2011/main" val="1"/>
+            </a:ext>
+          </a:extLst>
+        </p:spPr>
+        <p:txBody>
+          <a:bodyPr lIns="0" tIns="0" rIns="0" bIns="0">
+            <a:spAutoFit/>
+          </a:bodyPr>
+          <a:lstStyle/>
+          <a:p>
+            <a:pPr>
+              <a:defRPr sz="800"/>
+            </a:pPr>
+            <a:r>
+              <a:t>Double Top Variables:</a:t>
+            </a:r>
+          </a:p>
+          <a:p>
+            <a:pPr>
+              <a:defRPr sz="800"/>
+            </a:pPr>
+            <a:r>
+              <a:t>x_n = time (x-axis) to establish the pattern</a:t>
+            </a:r>
+          </a:p>
+          <a:p>
+            <a:pPr>
+              <a:defRPr sz="800"/>
+            </a:pPr>
+            <a:r>
+              <a:t>A = positive slope leading up to local max</a:t>
+            </a:r>
+          </a:p>
+          <a:p>
+            <a:pPr>
+              <a:defRPr sz="800"/>
+            </a:pPr>
+            <a:r>
+              <a:t>B = first test local max</a:t>
+            </a:r>
+          </a:p>
+          <a:p>
+            <a:pPr>
+              <a:defRPr sz="800"/>
+            </a:pPr>
+            <a:r>
+              <a:t>C = first local min immediately following A</a:t>
+            </a:r>
+          </a:p>
+          <a:p>
+            <a:pPr>
+              <a:defRPr sz="800"/>
+            </a:pPr>
+            <a:r>
+              <a:t>D = 2nd max within test of B tolerances</a:t>
+            </a:r>
+          </a:p>
+          <a:p>
+            <a:pPr>
+              <a:defRPr sz="800"/>
+            </a:pPr>
+            <a:r>
+              <a:t>E = break below C (candle close)</a:t>
+            </a:r>
+          </a:p>
+        </p:txBody>
+      </p:sp>
+      <p:sp>
+        <p:nvSpPr>
+          <p:cNvPr id="402" name="A"/>
+          <p:cNvSpPr txBox="1"/>
+          <p:nvPr/>
+        </p:nvSpPr>
+        <p:spPr>
+          <a:xfrm>
+            <a:off x="1183936" y="3301325"/>
+            <a:ext cx="131292" cy="197384"/>
+          </a:xfrm>
+          <a:prstGeom prst="rect">
+            <a:avLst/>
+          </a:prstGeom>
+          <a:ln w="12700">
+            <a:miter lim="400000"/>
+          </a:ln>
+          <a:extLst>
+            <a:ext uri="{C572A759-6A51-4108-AA02-DFA0A04FC94B}">
+              <ma14:wrappingTextBoxFlag xmlns:ma14="http://schemas.microsoft.com/office/mac/drawingml/2011/main" val="1"/>
+            </a:ext>
+          </a:extLst>
+        </p:spPr>
+        <p:txBody>
+          <a:bodyPr wrap="none" lIns="0" tIns="0" rIns="0" bIns="0">
+            <a:spAutoFit/>
+          </a:bodyPr>
+          <a:lstStyle/>
+          <a:p>
+            <a:pPr/>
+            <a:r>
+              <a:t>A</a:t>
+            </a:r>
+          </a:p>
+        </p:txBody>
+      </p:sp>
+      <p:sp>
+        <p:nvSpPr>
+          <p:cNvPr id="403" name="B"/>
+          <p:cNvSpPr txBox="1"/>
+          <p:nvPr/>
+        </p:nvSpPr>
+        <p:spPr>
+          <a:xfrm>
+            <a:off x="1637030" y="3033596"/>
+            <a:ext cx="131293" cy="197384"/>
+          </a:xfrm>
+          <a:prstGeom prst="rect">
+            <a:avLst/>
+          </a:prstGeom>
+          <a:ln w="12700">
+            <a:miter lim="400000"/>
+          </a:ln>
+          <a:extLst>
+            <a:ext uri="{C572A759-6A51-4108-AA02-DFA0A04FC94B}">
+              <ma14:wrappingTextBoxFlag xmlns:ma14="http://schemas.microsoft.com/office/mac/drawingml/2011/main" val="1"/>
+            </a:ext>
+          </a:extLst>
+        </p:spPr>
+        <p:txBody>
+          <a:bodyPr wrap="none" lIns="0" tIns="0" rIns="0" bIns="0">
+            <a:spAutoFit/>
+          </a:bodyPr>
+          <a:lstStyle/>
+          <a:p>
+            <a:pPr/>
+            <a:r>
+              <a:t>B</a:t>
+            </a:r>
+          </a:p>
+        </p:txBody>
+      </p:sp>
+      <p:sp>
+        <p:nvSpPr>
+          <p:cNvPr id="404" name="C"/>
+          <p:cNvSpPr txBox="1"/>
+          <p:nvPr/>
+        </p:nvSpPr>
+        <p:spPr>
+          <a:xfrm>
+            <a:off x="1881352" y="3650453"/>
+            <a:ext cx="141103" cy="197384"/>
+          </a:xfrm>
+          <a:prstGeom prst="rect">
+            <a:avLst/>
+          </a:prstGeom>
+          <a:ln w="12700">
+            <a:miter lim="400000"/>
+          </a:ln>
+          <a:extLst>
+            <a:ext uri="{C572A759-6A51-4108-AA02-DFA0A04FC94B}">
+              <ma14:wrappingTextBoxFlag xmlns:ma14="http://schemas.microsoft.com/office/mac/drawingml/2011/main" val="1"/>
+            </a:ext>
+          </a:extLst>
+        </p:spPr>
+        <p:txBody>
+          <a:bodyPr wrap="none" lIns="0" tIns="0" rIns="0" bIns="0">
+            <a:spAutoFit/>
+          </a:bodyPr>
+          <a:lstStyle/>
+          <a:p>
+            <a:pPr/>
+            <a:r>
+              <a:t>C</a:t>
+            </a:r>
+          </a:p>
+        </p:txBody>
+      </p:sp>
+      <p:sp>
+        <p:nvSpPr>
+          <p:cNvPr id="405" name="D"/>
+          <p:cNvSpPr txBox="1"/>
+          <p:nvPr/>
+        </p:nvSpPr>
+        <p:spPr>
+          <a:xfrm>
+            <a:off x="2231273" y="3170894"/>
+            <a:ext cx="141102" cy="197385"/>
+          </a:xfrm>
+          <a:prstGeom prst="rect">
+            <a:avLst/>
+          </a:prstGeom>
+          <a:ln w="12700">
+            <a:miter lim="400000"/>
+          </a:ln>
+          <a:extLst>
+            <a:ext uri="{C572A759-6A51-4108-AA02-DFA0A04FC94B}">
+              <ma14:wrappingTextBoxFlag xmlns:ma14="http://schemas.microsoft.com/office/mac/drawingml/2011/main" val="1"/>
+            </a:ext>
+          </a:extLst>
+        </p:spPr>
+        <p:txBody>
+          <a:bodyPr wrap="none" lIns="0" tIns="0" rIns="0" bIns="0">
+            <a:spAutoFit/>
+          </a:bodyPr>
+          <a:lstStyle/>
+          <a:p>
+            <a:pPr/>
+            <a:r>
+              <a:t>D</a:t>
+            </a:r>
+          </a:p>
+        </p:txBody>
+      </p:sp>
+      <p:sp>
+        <p:nvSpPr>
+          <p:cNvPr id="406" name="E"/>
+          <p:cNvSpPr txBox="1"/>
+          <p:nvPr/>
+        </p:nvSpPr>
+        <p:spPr>
+          <a:xfrm>
+            <a:off x="2389317" y="3446296"/>
+            <a:ext cx="131292" cy="197384"/>
+          </a:xfrm>
+          <a:prstGeom prst="rect">
+            <a:avLst/>
+          </a:prstGeom>
+          <a:ln w="12700">
+            <a:miter lim="400000"/>
+          </a:ln>
+          <a:extLst>
+            <a:ext uri="{C572A759-6A51-4108-AA02-DFA0A04FC94B}">
+              <ma14:wrappingTextBoxFlag xmlns:ma14="http://schemas.microsoft.com/office/mac/drawingml/2011/main" val="1"/>
+            </a:ext>
+          </a:extLst>
+        </p:spPr>
+        <p:txBody>
+          <a:bodyPr wrap="none" lIns="0" tIns="0" rIns="0" bIns="0">
+            <a:spAutoFit/>
+          </a:bodyPr>
+          <a:lstStyle/>
+          <a:p>
+            <a:pPr/>
+            <a:r>
+              <a:t>E</a:t>
+            </a:r>
+          </a:p>
+        </p:txBody>
+      </p:sp>
+      <p:sp>
+        <p:nvSpPr>
+          <p:cNvPr id="407" name="Line"/>
+          <p:cNvSpPr/>
+          <p:nvPr/>
+        </p:nvSpPr>
+        <p:spPr>
+          <a:xfrm>
+            <a:off x="1792548" y="3619307"/>
+            <a:ext cx="677536" cy="1"/>
+          </a:xfrm>
+          <a:prstGeom prst="line">
+            <a:avLst/>
+          </a:prstGeom>
+          <a:ln w="12700">
+            <a:solidFill>
+              <a:srgbClr val="2CE626"/>
+            </a:solidFill>
+            <a:custDash>
+              <a:ds d="200000" sp="200000"/>
+            </a:custDash>
+            <a:miter lim="400000"/>
+          </a:ln>
+          <a:effectLst>
+            <a:outerShdw sx="100000" sy="100000" kx="0" ky="0" algn="b" rotWithShape="0" blurRad="38100" dist="20000" dir="5400000">
+              <a:srgbClr val="000000">
+                <a:alpha val="38000"/>
+              </a:srgbClr>
+            </a:outerShdw>
+          </a:effectLst>
+        </p:spPr>
+        <p:txBody>
+          <a:bodyPr lIns="0" tIns="0" rIns="0" bIns="0"/>
+          <a:lstStyle/>
+          <a:p>
+            <a:pPr/>
+          </a:p>
+        </p:txBody>
+      </p:sp>
+      <p:sp>
+        <p:nvSpPr>
+          <p:cNvPr id="408" name="Line"/>
+          <p:cNvSpPr/>
+          <p:nvPr/>
+        </p:nvSpPr>
+        <p:spPr>
+          <a:xfrm>
+            <a:off x="1303452" y="3339425"/>
+            <a:ext cx="338783" cy="1"/>
+          </a:xfrm>
+          <a:prstGeom prst="line">
+            <a:avLst/>
+          </a:prstGeom>
+          <a:ln w="12700">
+            <a:solidFill>
+              <a:schemeClr val="accent1"/>
+            </a:solidFill>
+            <a:tailEnd type="triangle"/>
+          </a:ln>
+          <a:effectLst>
+            <a:outerShdw sx="100000" sy="100000" kx="0" ky="0" algn="b" rotWithShape="0" blurRad="38100" dist="20000" dir="5400000">
+              <a:srgbClr val="000000">
+                <a:alpha val="38000"/>
+              </a:srgbClr>
+            </a:outerShdw>
+          </a:effectLst>
+        </p:spPr>
+        <p:txBody>
+          <a:bodyPr lIns="0" tIns="0" rIns="0" bIns="0"/>
+          <a:lstStyle/>
+          <a:p>
+            <a:pPr/>
+          </a:p>
+        </p:txBody>
+      </p:sp>
+      <p:sp>
+        <p:nvSpPr>
+          <p:cNvPr id="409" name="Time scale: x = x_E - x_0…"/>
+          <p:cNvSpPr txBox="1"/>
+          <p:nvPr/>
+        </p:nvSpPr>
+        <p:spPr>
+          <a:xfrm>
+            <a:off x="6391216" y="3252065"/>
+            <a:ext cx="2355199" cy="796777"/>
+          </a:xfrm>
+          <a:prstGeom prst="rect">
+            <a:avLst/>
+          </a:prstGeom>
+          <a:ln w="12700">
+            <a:miter lim="400000"/>
+          </a:ln>
+          <a:extLst>
+            <a:ext uri="{C572A759-6A51-4108-AA02-DFA0A04FC94B}">
+              <ma14:wrappingTextBoxFlag xmlns:ma14="http://schemas.microsoft.com/office/mac/drawingml/2011/main" val="1"/>
+            </a:ext>
+          </a:extLst>
+        </p:spPr>
+        <p:txBody>
+          <a:bodyPr lIns="0" tIns="0" rIns="0" bIns="0">
+            <a:spAutoFit/>
+          </a:bodyPr>
+          <a:lstStyle/>
+          <a:p>
+            <a:pPr marL="106947" indent="-106947">
+              <a:buSzPct val="100000"/>
+              <a:buAutoNum type="arabicPeriod" startAt="1"/>
+              <a:defRPr sz="800"/>
+            </a:pPr>
+            <a:r>
+              <a:t>Time scale: x = x_E - x_0</a:t>
+            </a:r>
+          </a:p>
+          <a:p>
+            <a:pPr marL="106947" indent="-106947">
+              <a:buSzPct val="100000"/>
+              <a:buAutoNum type="arabicPeriod" startAt="1"/>
+              <a:defRPr sz="800"/>
+            </a:pPr>
+            <a:r>
+              <a:t>A = (how do we initiate??)</a:t>
+            </a:r>
+          </a:p>
+          <a:p>
+            <a:pPr marL="106947" indent="-106947">
+              <a:buSzPct val="100000"/>
+              <a:buAutoNum type="arabicPeriod" startAt="1"/>
+              <a:defRPr sz="800"/>
+            </a:pPr>
+            <a:r>
+              <a:t>B &gt; A</a:t>
+            </a:r>
+          </a:p>
+          <a:p>
+            <a:pPr marL="106947" indent="-106947">
+              <a:buSzPct val="100000"/>
+              <a:buAutoNum type="arabicPeriod" startAt="1"/>
+              <a:defRPr sz="800"/>
+            </a:pPr>
+            <a:r>
+              <a:t>C &lt; B</a:t>
+            </a:r>
+          </a:p>
+          <a:p>
+            <a:pPr marL="106947" indent="-106947">
+              <a:buSzPct val="100000"/>
+              <a:buAutoNum type="arabicPeriod" startAt="1"/>
+              <a:defRPr sz="800"/>
+            </a:pPr>
+            <a:r>
+              <a:t>D &gt; C and low &lt; D &lt; high</a:t>
+            </a:r>
+          </a:p>
+          <a:p>
+            <a:pPr marL="106947" indent="-106947">
+              <a:buSzPct val="100000"/>
+              <a:buAutoNum type="arabicPeriod" startAt="1"/>
+              <a:defRPr sz="800"/>
+            </a:pPr>
+            <a:r>
+              <a:t>E = C and close &lt; C</a:t>
+            </a:r>
+          </a:p>
+          <a:p>
+            <a:pPr marL="106947" indent="-106947">
+              <a:buSzPct val="100000"/>
+              <a:buAutoNum type="arabicPeriod" startAt="1"/>
+              <a:defRPr sz="800"/>
+            </a:pPr>
+            <a:r>
+              <a:t>Initiate Trigger/Signal</a:t>
+            </a:r>
+          </a:p>
+        </p:txBody>
+      </p:sp>
     </p:spTree>
   </p:cSld>
   <p:clrMapOvr>
@@ -18383,7 +18864,7 @@
       </p:grpSpPr>
       <p:sp>
         <p:nvSpPr>
-          <p:cNvPr id="401" name="Google Shape;357;p24"/>
+          <p:cNvPr id="411" name="Google Shape;357;p24"/>
           <p:cNvSpPr txBox="1"/>
           <p:nvPr/>
         </p:nvSpPr>
@@ -18431,7 +18912,7 @@
       </p:sp>
       <p:pic>
         <p:nvPicPr>
-          <p:cNvPr id="402" name="Google Shape;358;p24" descr="Google Shape;358;p24"/>
+          <p:cNvPr id="412" name="Google Shape;358;p24" descr="Google Shape;358;p24"/>
           <p:cNvPicPr>
             <a:picLocks noChangeAspect="1"/>
           </p:cNvPicPr>
@@ -18460,7 +18941,7 @@
       </p:pic>
       <p:grpSp>
         <p:nvGrpSpPr>
-          <p:cNvPr id="405" name="Google Shape;359;p24"/>
+          <p:cNvPr id="415" name="Google Shape;359;p24"/>
           <p:cNvGrpSpPr/>
           <p:nvPr/>
         </p:nvGrpSpPr>
@@ -18474,7 +18955,7 @@
         </p:grpSpPr>
         <p:sp>
           <p:nvSpPr>
-            <p:cNvPr id="403" name="Rectangle"/>
+            <p:cNvPr id="413" name="Rectangle"/>
             <p:cNvSpPr/>
             <p:nvPr/>
           </p:nvSpPr>
@@ -18527,7 +19008,7 @@
         </p:sp>
         <p:sp>
           <p:nvSpPr>
-            <p:cNvPr id="404" name="Reminder - this is a TEMPLATE. Please use this as a source of inspiration and transform this into a deck of your own.…"/>
+            <p:cNvPr id="414" name="Reminder - this is a TEMPLATE. Please use this as a source of inspiration and transform this into a deck of your own.…"/>
             <p:cNvSpPr txBox="1"/>
             <p:nvPr/>
           </p:nvSpPr>
@@ -18671,7 +19152,7 @@
       </p:grpSpPr>
       <p:sp>
         <p:nvSpPr>
-          <p:cNvPr id="407" name="Google Shape;364;p25"/>
+          <p:cNvPr id="417" name="Google Shape;364;p25"/>
           <p:cNvSpPr txBox="1"/>
           <p:nvPr>
             <p:ph type="title"/>
@@ -18699,7 +19180,7 @@
       </p:sp>
       <p:sp>
         <p:nvSpPr>
-          <p:cNvPr id="408" name="Google Shape;365;p25"/>
+          <p:cNvPr id="418" name="Google Shape;365;p25"/>
           <p:cNvSpPr txBox="1"/>
           <p:nvPr>
             <p:ph type="body" sz="quarter" idx="1"/>
@@ -18736,7 +19217,7 @@
       </p:sp>
       <p:sp>
         <p:nvSpPr>
-          <p:cNvPr id="409" name="Google Shape;366;p25"/>
+          <p:cNvPr id="419" name="Google Shape;366;p25"/>
           <p:cNvSpPr txBox="1"/>
           <p:nvPr/>
         </p:nvSpPr>
@@ -18794,7 +19275,7 @@
       </p:sp>
       <p:sp>
         <p:nvSpPr>
-          <p:cNvPr id="410" name="Google Shape;367;p25"/>
+          <p:cNvPr id="420" name="Google Shape;367;p25"/>
           <p:cNvSpPr txBox="1"/>
           <p:nvPr>
             <p:ph type="body" idx="21"/>
@@ -18835,7 +19316,7 @@
       </p:sp>
       <p:grpSp>
         <p:nvGrpSpPr>
-          <p:cNvPr id="413" name="Google Shape;368;p25"/>
+          <p:cNvPr id="423" name="Google Shape;368;p25"/>
           <p:cNvGrpSpPr/>
           <p:nvPr/>
         </p:nvGrpSpPr>
@@ -18849,7 +19330,7 @@
         </p:grpSpPr>
         <p:sp>
           <p:nvSpPr>
-            <p:cNvPr id="411" name="Rectangle"/>
+            <p:cNvPr id="421" name="Rectangle"/>
             <p:cNvSpPr/>
             <p:nvPr/>
           </p:nvSpPr>
@@ -18902,7 +19383,7 @@
         </p:sp>
         <p:sp>
           <p:nvSpPr>
-            <p:cNvPr id="412" name="Reminder - this is a TEMPLATE. Please use this as a source of inspiration and transform this into a deck of your own.…"/>
+            <p:cNvPr id="422" name="Reminder - this is a TEMPLATE. Please use this as a source of inspiration and transform this into a deck of your own.…"/>
             <p:cNvSpPr txBox="1"/>
             <p:nvPr/>
           </p:nvSpPr>
@@ -19046,7 +19527,7 @@
       </p:grpSpPr>
       <p:sp>
         <p:nvSpPr>
-          <p:cNvPr id="415" name="Google Shape;373;p26"/>
+          <p:cNvPr id="425" name="Google Shape;373;p26"/>
           <p:cNvSpPr txBox="1"/>
           <p:nvPr>
             <p:ph type="title"/>
@@ -19074,7 +19555,7 @@
       </p:sp>
       <p:sp>
         <p:nvSpPr>
-          <p:cNvPr id="416" name="Google Shape;374;p26"/>
+          <p:cNvPr id="426" name="Google Shape;374;p26"/>
           <p:cNvSpPr txBox="1"/>
           <p:nvPr>
             <p:ph type="body" sz="quarter" idx="1"/>
@@ -19122,7 +19603,7 @@
       </p:sp>
       <p:sp>
         <p:nvSpPr>
-          <p:cNvPr id="417" name="Google Shape;375;p26"/>
+          <p:cNvPr id="427" name="Google Shape;375;p26"/>
           <p:cNvSpPr txBox="1"/>
           <p:nvPr>
             <p:ph type="body" idx="21"/>
@@ -19193,7 +19674,7 @@
       </p:sp>
       <p:pic>
         <p:nvPicPr>
-          <p:cNvPr id="418" name="Google Shape;376;p26" descr="Google Shape;376;p26"/>
+          <p:cNvPr id="428" name="Google Shape;376;p26" descr="Google Shape;376;p26"/>
           <p:cNvPicPr>
             <a:picLocks noChangeAspect="1"/>
           </p:cNvPicPr>

</xml_diff>